<commit_message>
[2023-11-22] Spring boot 기본 end
</commit_message>
<xml_diff>
--- a/rest-api.pptx
+++ b/rest-api.pptx
@@ -6061,11 +6061,7 @@
           <a:p>
             <a:r>
               <a:rPr lang="en-US" altLang="ko-KR" dirty="0" smtClean="0"/>
-              <a:t>1</a:t>
-            </a:r>
-            <a:r>
-              <a:rPr lang="en-US" altLang="ko-KR" dirty="0" smtClean="0"/>
-              <a:t>. </a:t>
+              <a:t>1. </a:t>
             </a:r>
             <a:r>
               <a:rPr lang="ko-KR" altLang="en-US" dirty="0" smtClean="0"/>
@@ -6178,15 +6174,7 @@
             </a:r>
             <a:r>
               <a:rPr lang="en-US" altLang="ko-KR" dirty="0" smtClean="0"/>
-              <a:t>1) </a:t>
-            </a:r>
-            <a:r>
-              <a:rPr lang="en-US" altLang="ko-KR" dirty="0" smtClean="0"/>
-              <a:t>@</a:t>
-            </a:r>
-            <a:r>
-              <a:rPr lang="en-US" altLang="ko-KR" dirty="0" smtClean="0"/>
-              <a:t>interface </a:t>
+              <a:t>1) @interface </a:t>
             </a:r>
             <a:r>
               <a:rPr lang="ko-KR" altLang="en-US" dirty="0" smtClean="0"/>

</xml_diff>